<commit_message>
uml & erd added
</commit_message>
<xml_diff>
--- a/Kaavish Evaluation II/Evaluation II.pptx
+++ b/Kaavish Evaluation II/Evaluation II.pptx
@@ -13,9 +13,9 @@
     <p:sldId id="263" r:id="rId7"/>
     <p:sldId id="262" r:id="rId8"/>
     <p:sldId id="267" r:id="rId9"/>
-    <p:sldId id="272" r:id="rId10"/>
-    <p:sldId id="271" r:id="rId11"/>
-    <p:sldId id="270" r:id="rId12"/>
+    <p:sldId id="270" r:id="rId10"/>
+    <p:sldId id="272" r:id="rId11"/>
+    <p:sldId id="271" r:id="rId12"/>
     <p:sldId id="269" r:id="rId13"/>
     <p:sldId id="273" r:id="rId14"/>
     <p:sldId id="264" r:id="rId15"/>
@@ -134,9 +134,9 @@
         <p14:section name="Untitled Section" id="{78E4ACBF-82A5-4C2E-AF12-F7A5329093F4}">
           <p14:sldIdLst>
             <p14:sldId id="267"/>
+            <p14:sldId id="270"/>
             <p14:sldId id="272"/>
             <p14:sldId id="271"/>
-            <p14:sldId id="270"/>
             <p14:sldId id="269"/>
             <p14:sldId id="273"/>
             <p14:sldId id="264"/>
@@ -284,7 +284,7 @@
           <a:p>
             <a:fld id="{964B77FC-11F0-435C-BF58-30F6E93FA138}" type="datetimeFigureOut">
               <a:rPr lang="en-US" smtClean="0"/>
-              <a:t>12/9/2019</a:t>
+              <a:t>12/10/2019</a:t>
             </a:fld>
             <a:endParaRPr lang="en-US"/>
           </a:p>
@@ -571,7 +571,7 @@
           <a:p>
             <a:fld id="{964B77FC-11F0-435C-BF58-30F6E93FA138}" type="datetimeFigureOut">
               <a:rPr lang="en-US" smtClean="0"/>
-              <a:t>12/9/2019</a:t>
+              <a:t>12/10/2019</a:t>
             </a:fld>
             <a:endParaRPr lang="en-US"/>
           </a:p>
@@ -763,7 +763,7 @@
           <a:p>
             <a:fld id="{964B77FC-11F0-435C-BF58-30F6E93FA138}" type="datetimeFigureOut">
               <a:rPr lang="en-US" smtClean="0"/>
-              <a:t>12/9/2019</a:t>
+              <a:t>12/10/2019</a:t>
             </a:fld>
             <a:endParaRPr lang="en-US"/>
           </a:p>
@@ -1024,7 +1024,7 @@
           <a:p>
             <a:fld id="{964B77FC-11F0-435C-BF58-30F6E93FA138}" type="datetimeFigureOut">
               <a:rPr lang="en-US" smtClean="0"/>
-              <a:t>12/9/2019</a:t>
+              <a:t>12/10/2019</a:t>
             </a:fld>
             <a:endParaRPr lang="en-US"/>
           </a:p>
@@ -1448,7 +1448,7 @@
           <a:p>
             <a:fld id="{964B77FC-11F0-435C-BF58-30F6E93FA138}" type="datetimeFigureOut">
               <a:rPr lang="en-US" smtClean="0"/>
-              <a:t>12/9/2019</a:t>
+              <a:t>12/10/2019</a:t>
             </a:fld>
             <a:endParaRPr lang="en-US"/>
           </a:p>
@@ -1994,7 +1994,7 @@
           <a:p>
             <a:fld id="{964B77FC-11F0-435C-BF58-30F6E93FA138}" type="datetimeFigureOut">
               <a:rPr lang="en-US" smtClean="0"/>
-              <a:t>12/9/2019</a:t>
+              <a:t>12/10/2019</a:t>
             </a:fld>
             <a:endParaRPr lang="en-US"/>
           </a:p>
@@ -2834,7 +2834,7 @@
           <a:p>
             <a:fld id="{964B77FC-11F0-435C-BF58-30F6E93FA138}" type="datetimeFigureOut">
               <a:rPr lang="en-US" smtClean="0"/>
-              <a:t>12/9/2019</a:t>
+              <a:t>12/10/2019</a:t>
             </a:fld>
             <a:endParaRPr lang="en-US"/>
           </a:p>
@@ -3004,7 +3004,7 @@
           <a:p>
             <a:fld id="{964B77FC-11F0-435C-BF58-30F6E93FA138}" type="datetimeFigureOut">
               <a:rPr lang="en-US" smtClean="0"/>
-              <a:t>12/9/2019</a:t>
+              <a:t>12/10/2019</a:t>
             </a:fld>
             <a:endParaRPr lang="en-US"/>
           </a:p>
@@ -3188,7 +3188,7 @@
           <a:p>
             <a:fld id="{964B77FC-11F0-435C-BF58-30F6E93FA138}" type="datetimeFigureOut">
               <a:rPr lang="en-US" smtClean="0"/>
-              <a:t>12/9/2019</a:t>
+              <a:t>12/10/2019</a:t>
             </a:fld>
             <a:endParaRPr lang="en-US"/>
           </a:p>
@@ -3358,7 +3358,7 @@
           <a:p>
             <a:fld id="{964B77FC-11F0-435C-BF58-30F6E93FA138}" type="datetimeFigureOut">
               <a:rPr lang="en-US" smtClean="0"/>
-              <a:t>12/9/2019</a:t>
+              <a:t>12/10/2019</a:t>
             </a:fld>
             <a:endParaRPr lang="en-US"/>
           </a:p>
@@ -3606,7 +3606,7 @@
           <a:p>
             <a:fld id="{964B77FC-11F0-435C-BF58-30F6E93FA138}" type="datetimeFigureOut">
               <a:rPr lang="en-US" smtClean="0"/>
-              <a:t>12/9/2019</a:t>
+              <a:t>12/10/2019</a:t>
             </a:fld>
             <a:endParaRPr lang="en-US"/>
           </a:p>
@@ -3843,7 +3843,7 @@
           <a:p>
             <a:fld id="{964B77FC-11F0-435C-BF58-30F6E93FA138}" type="datetimeFigureOut">
               <a:rPr lang="en-US" smtClean="0"/>
-              <a:t>12/9/2019</a:t>
+              <a:t>12/10/2019</a:t>
             </a:fld>
             <a:endParaRPr lang="en-US"/>
           </a:p>
@@ -4216,7 +4216,7 @@
           <a:p>
             <a:fld id="{964B77FC-11F0-435C-BF58-30F6E93FA138}" type="datetimeFigureOut">
               <a:rPr lang="en-US" smtClean="0"/>
-              <a:t>12/9/2019</a:t>
+              <a:t>12/10/2019</a:t>
             </a:fld>
             <a:endParaRPr lang="en-US"/>
           </a:p>
@@ -4334,7 +4334,7 @@
           <a:p>
             <a:fld id="{964B77FC-11F0-435C-BF58-30F6E93FA138}" type="datetimeFigureOut">
               <a:rPr lang="en-US" smtClean="0"/>
-              <a:t>12/9/2019</a:t>
+              <a:t>12/10/2019</a:t>
             </a:fld>
             <a:endParaRPr lang="en-US"/>
           </a:p>
@@ -4429,7 +4429,7 @@
           <a:p>
             <a:fld id="{964B77FC-11F0-435C-BF58-30F6E93FA138}" type="datetimeFigureOut">
               <a:rPr lang="en-US" smtClean="0"/>
-              <a:t>12/9/2019</a:t>
+              <a:t>12/10/2019</a:t>
             </a:fld>
             <a:endParaRPr lang="en-US"/>
           </a:p>
@@ -4680,7 +4680,7 @@
           <a:p>
             <a:fld id="{964B77FC-11F0-435C-BF58-30F6E93FA138}" type="datetimeFigureOut">
               <a:rPr lang="en-US" smtClean="0"/>
-              <a:t>12/9/2019</a:t>
+              <a:t>12/10/2019</a:t>
             </a:fld>
             <a:endParaRPr lang="en-US"/>
           </a:p>
@@ -4967,7 +4967,7 @@
           <a:p>
             <a:fld id="{964B77FC-11F0-435C-BF58-30F6E93FA138}" type="datetimeFigureOut">
               <a:rPr lang="en-US" smtClean="0"/>
-              <a:t>12/9/2019</a:t>
+              <a:t>12/10/2019</a:t>
             </a:fld>
             <a:endParaRPr lang="en-US"/>
           </a:p>
@@ -5180,7 +5180,7 @@
           <a:p>
             <a:fld id="{964B77FC-11F0-435C-BF58-30F6E93FA138}" type="datetimeFigureOut">
               <a:rPr lang="en-US" smtClean="0"/>
-              <a:t>12/9/2019</a:t>
+              <a:t>12/10/2019</a:t>
             </a:fld>
             <a:endParaRPr lang="en-US"/>
           </a:p>
@@ -5948,10 +5948,10 @@
       </p:grpSpPr>
       <p:sp>
         <p:nvSpPr>
-          <p:cNvPr id="3" name="Title 2">
+          <p:cNvPr id="10" name="Title 9">
             <a:extLst>
               <a:ext uri="{FF2B5EF4-FFF2-40B4-BE49-F238E27FC236}">
-                <a16:creationId xmlns:a16="http://schemas.microsoft.com/office/drawing/2014/main" id="{C6DBA40B-0CD7-4EFA-B1AE-1E95BE404D1A}"/>
+                <a16:creationId xmlns:a16="http://schemas.microsoft.com/office/drawing/2014/main" id="{056224B3-0035-49B0-A87D-B585C513D56A}"/>
               </a:ext>
             </a:extLst>
           </p:cNvPr>
@@ -5964,8 +5964,8 @@
         </p:nvSpPr>
         <p:spPr>
           <a:xfrm>
-            <a:off x="2555479" y="145368"/>
-            <a:ext cx="7081041" cy="684628"/>
+            <a:off x="1144173" y="152861"/>
+            <a:ext cx="9903654" cy="951183"/>
           </a:xfrm>
         </p:spPr>
         <p:txBody>
@@ -5975,16 +5975,52 @@
           <a:lstStyle/>
           <a:p>
             <a:r>
-              <a:rPr lang="en-US" dirty="0"/>
-              <a:t>DESIGN: UML CLASS DIAGRAM</a:t>
-            </a:r>
-          </a:p>
-        </p:txBody>
-      </p:sp>
+              <a:rPr lang="en-US" sz="3600" dirty="0"/>
+              <a:t>DESIGN: ENTITY RELATIONSHIP DIAGRAM</a:t>
+            </a:r>
+          </a:p>
+        </p:txBody>
+      </p:sp>
+      <p:pic>
+        <p:nvPicPr>
+          <p:cNvPr id="11" name="Picture 10">
+            <a:extLst>
+              <a:ext uri="{FF2B5EF4-FFF2-40B4-BE49-F238E27FC236}">
+                <a16:creationId xmlns:a16="http://schemas.microsoft.com/office/drawing/2014/main" id="{BFE67DF7-F091-4E44-AB84-4F082D12D0A5}"/>
+              </a:ext>
+            </a:extLst>
+          </p:cNvPr>
+          <p:cNvPicPr>
+            <a:picLocks noChangeAspect="1"/>
+          </p:cNvPicPr>
+          <p:nvPr/>
+        </p:nvPicPr>
+        <p:blipFill>
+          <a:blip r:embed="rId2">
+            <a:extLst>
+              <a:ext uri="{28A0092B-C50C-407E-A947-70E740481C1C}">
+                <a14:useLocalDpi xmlns:a14="http://schemas.microsoft.com/office/drawing/2010/main" val="0"/>
+              </a:ext>
+            </a:extLst>
+          </a:blip>
+          <a:stretch>
+            <a:fillRect/>
+          </a:stretch>
+        </p:blipFill>
+        <p:spPr>
+          <a:xfrm>
+            <a:off x="1381128" y="1104044"/>
+            <a:ext cx="9429744" cy="5471658"/>
+          </a:xfrm>
+          <a:prstGeom prst="rect">
+            <a:avLst/>
+          </a:prstGeom>
+        </p:spPr>
+      </p:pic>
     </p:spTree>
     <p:extLst>
       <p:ext uri="{BB962C8B-B14F-4D97-AF65-F5344CB8AC3E}">
-        <p14:creationId xmlns:p14="http://schemas.microsoft.com/office/powerpoint/2010/main" val="1176727767"/>
+        <p14:creationId xmlns:p14="http://schemas.microsoft.com/office/powerpoint/2010/main" val="3368211307"/>
       </p:ext>
     </p:extLst>
   </p:cSld>
@@ -6016,7 +6052,7 @@
           <p:cNvPr id="3" name="Title 2">
             <a:extLst>
               <a:ext uri="{FF2B5EF4-FFF2-40B4-BE49-F238E27FC236}">
-                <a16:creationId xmlns:a16="http://schemas.microsoft.com/office/drawing/2014/main" id="{69E826AC-8DC7-46F5-BF97-11F697D8B9DD}"/>
+                <a16:creationId xmlns:a16="http://schemas.microsoft.com/office/drawing/2014/main" id="{C6DBA40B-0CD7-4EFA-B1AE-1E95BE404D1A}"/>
               </a:ext>
             </a:extLst>
           </p:cNvPr>
@@ -6029,8 +6065,8 @@
         </p:nvSpPr>
         <p:spPr>
           <a:xfrm>
-            <a:off x="0" y="187569"/>
-            <a:ext cx="12192000" cy="628357"/>
+            <a:off x="2555479" y="145368"/>
+            <a:ext cx="7081041" cy="684628"/>
           </a:xfrm>
         </p:spPr>
         <p:txBody>
@@ -6041,17 +6077,17 @@
           <a:p>
             <a:r>
               <a:rPr lang="en-US" dirty="0"/>
-              <a:t>LITERATURE REVIEW: A CONCEPTUAL FRAMEWORK </a:t>
+              <a:t>DESIGN: UML CLASS DIAGRAM</a:t>
             </a:r>
           </a:p>
         </p:txBody>
       </p:sp>
       <p:pic>
         <p:nvPicPr>
-          <p:cNvPr id="8" name="Picture 7">
+          <p:cNvPr id="7" name="Picture 6">
             <a:extLst>
               <a:ext uri="{FF2B5EF4-FFF2-40B4-BE49-F238E27FC236}">
-                <a16:creationId xmlns:a16="http://schemas.microsoft.com/office/drawing/2014/main" id="{7779068C-38D3-4C4A-BF7A-A428B1107274}"/>
+                <a16:creationId xmlns:a16="http://schemas.microsoft.com/office/drawing/2014/main" id="{148976F7-47A7-4EA1-B005-3487C91B4958}"/>
               </a:ext>
             </a:extLst>
           </p:cNvPr>
@@ -6074,60 +6110,18 @@
         </p:blipFill>
         <p:spPr>
           <a:xfrm>
-            <a:off x="2368025" y="815926"/>
-            <a:ext cx="7455949" cy="5636909"/>
+            <a:off x="3093719" y="867054"/>
+            <a:ext cx="6004560" cy="5123892"/>
           </a:xfrm>
           <a:prstGeom prst="rect">
             <a:avLst/>
           </a:prstGeom>
         </p:spPr>
       </p:pic>
-      <p:sp>
-        <p:nvSpPr>
-          <p:cNvPr id="9" name="TextBox 8">
-            <a:extLst>
-              <a:ext uri="{FF2B5EF4-FFF2-40B4-BE49-F238E27FC236}">
-                <a16:creationId xmlns:a16="http://schemas.microsoft.com/office/drawing/2014/main" id="{89842C7F-D3F9-4964-86E7-941FE6E7A80C}"/>
-              </a:ext>
-            </a:extLst>
-          </p:cNvPr>
-          <p:cNvSpPr txBox="1"/>
-          <p:nvPr/>
-        </p:nvSpPr>
-        <p:spPr>
-          <a:xfrm>
-            <a:off x="1463040" y="6531931"/>
-            <a:ext cx="9566080" cy="276999"/>
-          </a:xfrm>
-          <a:prstGeom prst="rect">
-            <a:avLst/>
-          </a:prstGeom>
-          <a:noFill/>
-        </p:spPr>
-        <p:txBody>
-          <a:bodyPr wrap="none" rtlCol="0">
-            <a:spAutoFit/>
-          </a:bodyPr>
-          <a:lstStyle/>
-          <a:p>
-            <a:r>
-              <a:rPr lang="en-US" sz="1200" dirty="0"/>
-              <a:t>Link to Online Document: </a:t>
-            </a:r>
-            <a:r>
-              <a:rPr lang="en-US" sz="1200" dirty="0">
-                <a:hlinkClick r:id="rId3"/>
-              </a:rPr>
-              <a:t>https://www.papeeria.com/p/690c65b3ea665c1f0d55fd141cb2127d#/Kaavish+Report/chapters/review.tex</a:t>
-            </a:r>
-            <a:endParaRPr lang="en-US" sz="1200" dirty="0"/>
-          </a:p>
-        </p:txBody>
-      </p:sp>
     </p:spTree>
     <p:extLst>
       <p:ext uri="{BB962C8B-B14F-4D97-AF65-F5344CB8AC3E}">
-        <p14:creationId xmlns:p14="http://schemas.microsoft.com/office/powerpoint/2010/main" val="238338035"/>
+        <p14:creationId xmlns:p14="http://schemas.microsoft.com/office/powerpoint/2010/main" val="1176727767"/>
       </p:ext>
     </p:extLst>
   </p:cSld>
@@ -10173,10 +10167,10 @@
       </p:pic>
       <p:pic>
         <p:nvPicPr>
-          <p:cNvPr id="1048" name="Picture 24" descr="Image result for passport js png">
+          <p:cNvPr id="1054" name="Picture 30" descr="Image result for react native png">
             <a:extLst>
               <a:ext uri="{FF2B5EF4-FFF2-40B4-BE49-F238E27FC236}">
-                <a16:creationId xmlns:a16="http://schemas.microsoft.com/office/drawing/2014/main" id="{49941F8F-66A1-4A72-A198-830D4C31A3EA}"/>
+                <a16:creationId xmlns:a16="http://schemas.microsoft.com/office/drawing/2014/main" id="{D55C1118-8479-49C9-A993-258A7612B3F6}"/>
               </a:ext>
             </a:extLst>
           </p:cNvPr>
@@ -10186,13 +10180,13 @@
           <p:nvPr/>
         </p:nvPicPr>
         <p:blipFill>
-          <a:blip r:embed="rId8">
+          <a:blip r:embed="rId8" cstate="hqprint">
             <a:duotone>
-              <a:prstClr val="black"/>
               <a:schemeClr val="accent2">
-                <a:tint val="45000"/>
-                <a:satMod val="400000"/>
+                <a:shade val="45000"/>
+                <a:satMod val="135000"/>
               </a:schemeClr>
+              <a:prstClr val="white"/>
             </a:duotone>
             <a:extLst>
               <a:ext uri="{28A0092B-C50C-407E-A947-70E740481C1C}">
@@ -10207,30 +10201,50 @@
         </p:blipFill>
         <p:spPr bwMode="auto">
           <a:xfrm>
-            <a:off x="10394949" y="2721883"/>
-            <a:ext cx="1020762" cy="1020762"/>
+            <a:off x="5881194" y="4868678"/>
+            <a:ext cx="937670" cy="709588"/>
           </a:xfrm>
           <a:prstGeom prst="rect">
             <a:avLst/>
           </a:prstGeom>
           <a:noFill/>
-          <a:extLst>
-            <a:ext uri="{909E8E84-426E-40DD-AFC4-6F175D3DCCD1}">
-              <a14:hiddenFill xmlns:a14="http://schemas.microsoft.com/office/drawing/2010/main">
-                <a:solidFill>
-                  <a:srgbClr val="FFFFFF"/>
-                </a:solidFill>
-              </a14:hiddenFill>
-            </a:ext>
-          </a:extLst>
         </p:spPr>
       </p:pic>
+      <p:sp>
+        <p:nvSpPr>
+          <p:cNvPr id="17" name="TextBox 16"/>
+          <p:cNvSpPr txBox="1"/>
+          <p:nvPr/>
+        </p:nvSpPr>
+        <p:spPr>
+          <a:xfrm>
+            <a:off x="818793" y="5966916"/>
+            <a:ext cx="1742400" cy="307777"/>
+          </a:xfrm>
+          <a:prstGeom prst="rect">
+            <a:avLst/>
+          </a:prstGeom>
+          <a:noFill/>
+        </p:spPr>
+        <p:txBody>
+          <a:bodyPr wrap="none" rtlCol="0">
+            <a:spAutoFit/>
+          </a:bodyPr>
+          <a:lstStyle/>
+          <a:p>
+            <a:r>
+              <a:rPr lang="en-US" sz="1400" dirty="0"/>
+              <a:t>*Subject to change</a:t>
+            </a:r>
+          </a:p>
+        </p:txBody>
+      </p:sp>
       <p:pic>
         <p:nvPicPr>
-          <p:cNvPr id="1054" name="Picture 30" descr="Image result for react native png">
+          <p:cNvPr id="1026" name="Picture 2" descr="Image result for nodejs">
             <a:extLst>
               <a:ext uri="{FF2B5EF4-FFF2-40B4-BE49-F238E27FC236}">
-                <a16:creationId xmlns:a16="http://schemas.microsoft.com/office/drawing/2014/main" id="{D55C1118-8479-49C9-A993-258A7612B3F6}"/>
+                <a16:creationId xmlns:a16="http://schemas.microsoft.com/office/drawing/2014/main" id="{332CD132-5034-40DF-93E1-BFAD4E6334FC}"/>
               </a:ext>
             </a:extLst>
           </p:cNvPr>
@@ -10261,50 +10275,30 @@
         </p:blipFill>
         <p:spPr bwMode="auto">
           <a:xfrm>
-            <a:off x="5881194" y="4868678"/>
-            <a:ext cx="937670" cy="709588"/>
+            <a:off x="4992309" y="2759561"/>
+            <a:ext cx="1324895" cy="810357"/>
           </a:xfrm>
           <a:prstGeom prst="rect">
             <a:avLst/>
           </a:prstGeom>
           <a:noFill/>
+          <a:extLst>
+            <a:ext uri="{909E8E84-426E-40DD-AFC4-6F175D3DCCD1}">
+              <a14:hiddenFill xmlns:a14="http://schemas.microsoft.com/office/drawing/2010/main">
+                <a:solidFill>
+                  <a:srgbClr val="FFFFFF"/>
+                </a:solidFill>
+              </a14:hiddenFill>
+            </a:ext>
+          </a:extLst>
         </p:spPr>
       </p:pic>
-      <p:sp>
-        <p:nvSpPr>
-          <p:cNvPr id="17" name="TextBox 16"/>
-          <p:cNvSpPr txBox="1"/>
-          <p:nvPr/>
-        </p:nvSpPr>
-        <p:spPr>
-          <a:xfrm>
-            <a:off x="818793" y="5966916"/>
-            <a:ext cx="1742400" cy="307777"/>
-          </a:xfrm>
-          <a:prstGeom prst="rect">
-            <a:avLst/>
-          </a:prstGeom>
-          <a:noFill/>
-        </p:spPr>
-        <p:txBody>
-          <a:bodyPr wrap="none" rtlCol="0">
-            <a:spAutoFit/>
-          </a:bodyPr>
-          <a:lstStyle/>
-          <a:p>
-            <a:r>
-              <a:rPr lang="en-US" sz="1400" dirty="0"/>
-              <a:t>*Subject to change</a:t>
-            </a:r>
-          </a:p>
-        </p:txBody>
-      </p:sp>
       <p:pic>
         <p:nvPicPr>
-          <p:cNvPr id="1026" name="Picture 2" descr="Image result for nodejs">
+          <p:cNvPr id="1030" name="Picture 6" descr="Image result for express js">
             <a:extLst>
               <a:ext uri="{FF2B5EF4-FFF2-40B4-BE49-F238E27FC236}">
-                <a16:creationId xmlns:a16="http://schemas.microsoft.com/office/drawing/2014/main" id="{332CD132-5034-40DF-93E1-BFAD4E6334FC}"/>
+                <a16:creationId xmlns:a16="http://schemas.microsoft.com/office/drawing/2014/main" id="{1623F1FA-9CD0-47DA-B14A-C7AC0D304046}"/>
               </a:ext>
             </a:extLst>
           </p:cNvPr>
@@ -10335,60 +10329,6 @@
         </p:blipFill>
         <p:spPr bwMode="auto">
           <a:xfrm>
-            <a:off x="4992309" y="2759561"/>
-            <a:ext cx="1324895" cy="810357"/>
-          </a:xfrm>
-          <a:prstGeom prst="rect">
-            <a:avLst/>
-          </a:prstGeom>
-          <a:noFill/>
-          <a:extLst>
-            <a:ext uri="{909E8E84-426E-40DD-AFC4-6F175D3DCCD1}">
-              <a14:hiddenFill xmlns:a14="http://schemas.microsoft.com/office/drawing/2010/main">
-                <a:solidFill>
-                  <a:srgbClr val="FFFFFF"/>
-                </a:solidFill>
-              </a14:hiddenFill>
-            </a:ext>
-          </a:extLst>
-        </p:spPr>
-      </p:pic>
-      <p:pic>
-        <p:nvPicPr>
-          <p:cNvPr id="1030" name="Picture 6" descr="Image result for express js">
-            <a:extLst>
-              <a:ext uri="{FF2B5EF4-FFF2-40B4-BE49-F238E27FC236}">
-                <a16:creationId xmlns:a16="http://schemas.microsoft.com/office/drawing/2014/main" id="{1623F1FA-9CD0-47DA-B14A-C7AC0D304046}"/>
-              </a:ext>
-            </a:extLst>
-          </p:cNvPr>
-          <p:cNvPicPr>
-            <a:picLocks noChangeAspect="1" noChangeArrowheads="1"/>
-          </p:cNvPicPr>
-          <p:nvPr/>
-        </p:nvPicPr>
-        <p:blipFill>
-          <a:blip r:embed="rId11" cstate="hqprint">
-            <a:duotone>
-              <a:schemeClr val="accent2">
-                <a:shade val="45000"/>
-                <a:satMod val="135000"/>
-              </a:schemeClr>
-              <a:prstClr val="white"/>
-            </a:duotone>
-            <a:extLst>
-              <a:ext uri="{28A0092B-C50C-407E-A947-70E740481C1C}">
-                <a14:useLocalDpi xmlns:a14="http://schemas.microsoft.com/office/drawing/2010/main" val="0"/>
-              </a:ext>
-            </a:extLst>
-          </a:blip>
-          <a:srcRect/>
-          <a:stretch>
-            <a:fillRect/>
-          </a:stretch>
-        </p:blipFill>
-        <p:spPr bwMode="auto">
-          <a:xfrm>
             <a:off x="8481232" y="2919332"/>
             <a:ext cx="1665268" cy="690177"/>
           </a:xfrm>
@@ -10422,7 +10362,7 @@
           <p:nvPr/>
         </p:nvPicPr>
         <p:blipFill>
-          <a:blip r:embed="rId12">
+          <a:blip r:embed="rId11">
             <a:duotone>
               <a:schemeClr val="accent2">
                 <a:shade val="45000"/>
@@ -10476,7 +10416,7 @@
           <p:nvPr/>
         </p:nvPicPr>
         <p:blipFill>
-          <a:blip r:embed="rId13">
+          <a:blip r:embed="rId12">
             <a:duotone>
               <a:schemeClr val="accent2">
                 <a:shade val="45000"/>
@@ -13761,10 +13701,10 @@
       </p:grpSpPr>
       <p:sp>
         <p:nvSpPr>
-          <p:cNvPr id="10" name="Title 9">
+          <p:cNvPr id="3" name="Title 2">
             <a:extLst>
               <a:ext uri="{FF2B5EF4-FFF2-40B4-BE49-F238E27FC236}">
-                <a16:creationId xmlns:a16="http://schemas.microsoft.com/office/drawing/2014/main" id="{056224B3-0035-49B0-A87D-B585C513D56A}"/>
+                <a16:creationId xmlns:a16="http://schemas.microsoft.com/office/drawing/2014/main" id="{69E826AC-8DC7-46F5-BF97-11F697D8B9DD}"/>
               </a:ext>
             </a:extLst>
           </p:cNvPr>
@@ -13777,8 +13717,8 @@
         </p:nvSpPr>
         <p:spPr>
           <a:xfrm>
-            <a:off x="1144173" y="152861"/>
-            <a:ext cx="9903654" cy="951183"/>
+            <a:off x="0" y="187569"/>
+            <a:ext cx="12192000" cy="628357"/>
           </a:xfrm>
         </p:spPr>
         <p:txBody>
@@ -13788,27 +13728,25 @@
           <a:lstStyle/>
           <a:p>
             <a:r>
-              <a:rPr lang="en-US" sz="3600" dirty="0"/>
-              <a:t>DESIGN: ENTITY RELATIONSHIP DIAGRAM</a:t>
+              <a:rPr lang="en-US" dirty="0"/>
+              <a:t>LITERATURE REVIEW: A CONCEPTUAL FRAMEWORK </a:t>
             </a:r>
           </a:p>
         </p:txBody>
       </p:sp>
       <p:pic>
         <p:nvPicPr>
-          <p:cNvPr id="14" name="Content Placeholder 13">
+          <p:cNvPr id="8" name="Picture 7">
             <a:extLst>
               <a:ext uri="{FF2B5EF4-FFF2-40B4-BE49-F238E27FC236}">
-                <a16:creationId xmlns:a16="http://schemas.microsoft.com/office/drawing/2014/main" id="{E4D6ED86-F4C8-4953-B94D-D756F63DA231}"/>
+                <a16:creationId xmlns:a16="http://schemas.microsoft.com/office/drawing/2014/main" id="{7779068C-38D3-4C4A-BF7A-A428B1107274}"/>
               </a:ext>
             </a:extLst>
           </p:cNvPr>
           <p:cNvPicPr>
-            <a:picLocks noGrp="1" noChangeAspect="1"/>
+            <a:picLocks noChangeAspect="1"/>
           </p:cNvPicPr>
-          <p:nvPr>
-            <p:ph idx="1"/>
-          </p:nvPr>
+          <p:nvPr/>
         </p:nvPicPr>
         <p:blipFill>
           <a:blip r:embed="rId2">
@@ -13824,15 +13762,60 @@
         </p:blipFill>
         <p:spPr>
           <a:xfrm>
-            <a:off x="1324874" y="1104044"/>
-            <a:ext cx="9542252" cy="5360061"/>
+            <a:off x="2368025" y="815926"/>
+            <a:ext cx="7455949" cy="5636909"/>
           </a:xfrm>
+          <a:prstGeom prst="rect">
+            <a:avLst/>
+          </a:prstGeom>
         </p:spPr>
       </p:pic>
+      <p:sp>
+        <p:nvSpPr>
+          <p:cNvPr id="9" name="TextBox 8">
+            <a:extLst>
+              <a:ext uri="{FF2B5EF4-FFF2-40B4-BE49-F238E27FC236}">
+                <a16:creationId xmlns:a16="http://schemas.microsoft.com/office/drawing/2014/main" id="{89842C7F-D3F9-4964-86E7-941FE6E7A80C}"/>
+              </a:ext>
+            </a:extLst>
+          </p:cNvPr>
+          <p:cNvSpPr txBox="1"/>
+          <p:nvPr/>
+        </p:nvSpPr>
+        <p:spPr>
+          <a:xfrm>
+            <a:off x="1463040" y="6531931"/>
+            <a:ext cx="9566080" cy="276999"/>
+          </a:xfrm>
+          <a:prstGeom prst="rect">
+            <a:avLst/>
+          </a:prstGeom>
+          <a:noFill/>
+        </p:spPr>
+        <p:txBody>
+          <a:bodyPr wrap="none" rtlCol="0">
+            <a:spAutoFit/>
+          </a:bodyPr>
+          <a:lstStyle/>
+          <a:p>
+            <a:r>
+              <a:rPr lang="en-US" sz="1200" dirty="0"/>
+              <a:t>Link to Online Document: </a:t>
+            </a:r>
+            <a:r>
+              <a:rPr lang="en-US" sz="1200" dirty="0">
+                <a:hlinkClick r:id="rId3"/>
+              </a:rPr>
+              <a:t>https://www.papeeria.com/p/690c65b3ea665c1f0d55fd141cb2127d#/Kaavish+Report/chapters/review.tex</a:t>
+            </a:r>
+            <a:endParaRPr lang="en-US" sz="1200" dirty="0"/>
+          </a:p>
+        </p:txBody>
+      </p:sp>
     </p:spTree>
     <p:extLst>
       <p:ext uri="{BB962C8B-B14F-4D97-AF65-F5344CB8AC3E}">
-        <p14:creationId xmlns:p14="http://schemas.microsoft.com/office/powerpoint/2010/main" val="3368211307"/>
+        <p14:creationId xmlns:p14="http://schemas.microsoft.com/office/powerpoint/2010/main" val="238338035"/>
       </p:ext>
     </p:extLst>
   </p:cSld>

</xml_diff>